<commit_message>
Finalize the matrix algebra slides
</commit_message>
<xml_diff>
--- a/static/Course_Modularization/Markov models/Markov Sick-Sicker/figures/3D array state transitions.pptx
+++ b/static/Course_Modularization/Markov models/Markov Sick-Sicker/figures/3D array state transitions.pptx
@@ -218,7 +218,7 @@
           <a:p>
             <a:fld id="{E0381104-F94C-4175-B361-FD61334C33BE}" type="datetimeFigureOut">
               <a:rPr lang="en-GB" smtClean="0"/>
-              <a:t>15/12/2021</a:t>
+              <a:t>26/01/2022</a:t>
             </a:fld>
             <a:endParaRPr lang="en-GB"/>
           </a:p>
@@ -1661,7 +1661,7 @@
           <a:p>
             <a:fld id="{F54B85EC-EFA6-4E19-A184-28529D458E8B}" type="datetimeFigureOut">
               <a:rPr lang="en-GB" smtClean="0"/>
-              <a:t>15/12/2021</a:t>
+              <a:t>26/01/2022</a:t>
             </a:fld>
             <a:endParaRPr lang="en-GB"/>
           </a:p>
@@ -1831,7 +1831,7 @@
           <a:p>
             <a:fld id="{F54B85EC-EFA6-4E19-A184-28529D458E8B}" type="datetimeFigureOut">
               <a:rPr lang="en-GB" smtClean="0"/>
-              <a:t>15/12/2021</a:t>
+              <a:t>26/01/2022</a:t>
             </a:fld>
             <a:endParaRPr lang="en-GB"/>
           </a:p>
@@ -2011,7 +2011,7 @@
           <a:p>
             <a:fld id="{F54B85EC-EFA6-4E19-A184-28529D458E8B}" type="datetimeFigureOut">
               <a:rPr lang="en-GB" smtClean="0"/>
-              <a:t>15/12/2021</a:t>
+              <a:t>26/01/2022</a:t>
             </a:fld>
             <a:endParaRPr lang="en-GB"/>
           </a:p>
@@ -2181,7 +2181,7 @@
           <a:p>
             <a:fld id="{F54B85EC-EFA6-4E19-A184-28529D458E8B}" type="datetimeFigureOut">
               <a:rPr lang="en-GB" smtClean="0"/>
-              <a:t>15/12/2021</a:t>
+              <a:t>26/01/2022</a:t>
             </a:fld>
             <a:endParaRPr lang="en-GB"/>
           </a:p>
@@ -2427,7 +2427,7 @@
           <a:p>
             <a:fld id="{F54B85EC-EFA6-4E19-A184-28529D458E8B}" type="datetimeFigureOut">
               <a:rPr lang="en-GB" smtClean="0"/>
-              <a:t>15/12/2021</a:t>
+              <a:t>26/01/2022</a:t>
             </a:fld>
             <a:endParaRPr lang="en-GB"/>
           </a:p>
@@ -2715,7 +2715,7 @@
           <a:p>
             <a:fld id="{F54B85EC-EFA6-4E19-A184-28529D458E8B}" type="datetimeFigureOut">
               <a:rPr lang="en-GB" smtClean="0"/>
-              <a:t>15/12/2021</a:t>
+              <a:t>26/01/2022</a:t>
             </a:fld>
             <a:endParaRPr lang="en-GB"/>
           </a:p>
@@ -3137,7 +3137,7 @@
           <a:p>
             <a:fld id="{F54B85EC-EFA6-4E19-A184-28529D458E8B}" type="datetimeFigureOut">
               <a:rPr lang="en-GB" smtClean="0"/>
-              <a:t>15/12/2021</a:t>
+              <a:t>26/01/2022</a:t>
             </a:fld>
             <a:endParaRPr lang="en-GB"/>
           </a:p>
@@ -3255,7 +3255,7 @@
           <a:p>
             <a:fld id="{F54B85EC-EFA6-4E19-A184-28529D458E8B}" type="datetimeFigureOut">
               <a:rPr lang="en-GB" smtClean="0"/>
-              <a:t>15/12/2021</a:t>
+              <a:t>26/01/2022</a:t>
             </a:fld>
             <a:endParaRPr lang="en-GB"/>
           </a:p>
@@ -3350,7 +3350,7 @@
           <a:p>
             <a:fld id="{F54B85EC-EFA6-4E19-A184-28529D458E8B}" type="datetimeFigureOut">
               <a:rPr lang="en-GB" smtClean="0"/>
-              <a:t>15/12/2021</a:t>
+              <a:t>26/01/2022</a:t>
             </a:fld>
             <a:endParaRPr lang="en-GB"/>
           </a:p>
@@ -3627,7 +3627,7 @@
           <a:p>
             <a:fld id="{F54B85EC-EFA6-4E19-A184-28529D458E8B}" type="datetimeFigureOut">
               <a:rPr lang="en-GB" smtClean="0"/>
-              <a:t>15/12/2021</a:t>
+              <a:t>26/01/2022</a:t>
             </a:fld>
             <a:endParaRPr lang="en-GB"/>
           </a:p>
@@ -3880,7 +3880,7 @@
           <a:p>
             <a:fld id="{F54B85EC-EFA6-4E19-A184-28529D458E8B}" type="datetimeFigureOut">
               <a:rPr lang="en-GB" smtClean="0"/>
-              <a:t>15/12/2021</a:t>
+              <a:t>26/01/2022</a:t>
             </a:fld>
             <a:endParaRPr lang="en-GB"/>
           </a:p>
@@ -4093,7 +4093,7 @@
           <a:p>
             <a:fld id="{F54B85EC-EFA6-4E19-A184-28529D458E8B}" type="datetimeFigureOut">
               <a:rPr lang="en-GB" smtClean="0"/>
-              <a:t>15/12/2021</a:t>
+              <a:t>26/01/2022</a:t>
             </a:fld>
             <a:endParaRPr lang="en-GB"/>
           </a:p>
@@ -4541,7 +4541,7 @@
         </p:blipFill>
         <p:spPr bwMode="auto">
           <a:xfrm>
-            <a:off x="35496" y="3974471"/>
+            <a:off x="35496" y="3933056"/>
             <a:ext cx="6167387" cy="2453489"/>
           </a:xfrm>
           <a:prstGeom prst="rect">

</xml_diff>